<commit_message>
adjusted logo. news changed
</commit_message>
<xml_diff>
--- a/ppt/chenile.pptx
+++ b/ppt/chenile.pptx
@@ -1360,7 +1360,7 @@
             <a:t>Evolve an independent architecture / tech </a:t>
           </a:r>
           <a:r>
-            <a:rPr lang="en-US" b="0" i="0">
+            <a:rPr lang="en-US" b="0" i="0" dirty="0" err="1">
               <a:latin typeface="Futura Medium" panose="020B0602020204020303" pitchFamily="34" charset="-79"/>
               <a:cs typeface="Futura Medium" panose="020B0602020204020303" pitchFamily="34" charset="-79"/>
             </a:rPr>
@@ -2056,7 +2056,7 @@
             <a:t>Evolve an independent architecture / tech </a:t>
           </a:r>
           <a:r>
-            <a:rPr lang="en-US" sz="1600" b="0" i="0" kern="1200">
+            <a:rPr lang="en-US" sz="1600" b="0" i="0" kern="1200" dirty="0" err="1">
               <a:latin typeface="Futura Medium" panose="020B0602020204020303" pitchFamily="34" charset="-79"/>
               <a:cs typeface="Futura Medium" panose="020B0602020204020303" pitchFamily="34" charset="-79"/>
             </a:rPr>
@@ -23210,7 +23210,7 @@
           <p:nvPr>
             <p:extLst>
               <p:ext uri="{D42A27DB-BD31-4B8C-83A1-F6EECF244321}">
-                <p14:modId xmlns:p14="http://schemas.microsoft.com/office/powerpoint/2010/main" val="202899432"/>
+                <p14:modId xmlns:p14="http://schemas.microsoft.com/office/powerpoint/2010/main" val="1635194736"/>
               </p:ext>
             </p:extLst>
           </p:nvPr>

</xml_diff>